<commit_message>
Updating Kaggle link in presentation
</commit_message>
<xml_diff>
--- a/Lung Cancer Predication.pptx
+++ b/Lung Cancer Predication.pptx
@@ -51243,7 +51243,16 @@
               <a:rPr lang="en-US" dirty="0"/>
               <a:t>This dataset contains information on patients with lung cancer, including their age, gender, air pollution exposure, alcohol use, dust allergy, occupational hazards, genetic risk, chronic lung disease, balanced diet, obesity, smoking, passive smoker, chest pain, coughing of blood, fatigue, weight loss ,shortness of breath ,wheezing ,swallowing difficulty ,clubbing of fingernails and snoring.</a:t>
             </a:r>
-            <a:endParaRPr lang="en-ZA" noProof="1"/>
+            <a:endParaRPr lang="ar-EG" dirty="0"/>
+          </a:p>
+          <a:p>
+            <a:endParaRPr lang="ar-EG" noProof="1"/>
+          </a:p>
+          <a:p>
+            <a:r>
+              <a:rPr lang="en-US" noProof="1"/>
+              <a:t>Kaggle Link: https://www.kaggle.com/datasets/thedevastator/cancer-patients-and-air-pollution-a-new-link</a:t>
+            </a:r>
           </a:p>
         </p:txBody>
       </p:sp>
@@ -53110,6 +53119,35 @@
 </file>
 
 <file path=customXml/item1.xml><?xml version="1.0" encoding="utf-8"?>
+<p:properties xmlns:p="http://schemas.microsoft.com/office/2006/metadata/properties" xmlns:xsi="http://www.w3.org/2001/XMLSchema-instance" xmlns:pc="http://schemas.microsoft.com/office/infopath/2007/PartnerControls">
+  <documentManagement>
+    <_ip_UnifiedCompliancePolicyUIAction xmlns="http://schemas.microsoft.com/sharepoint/v3" xsi:nil="true"/>
+    <Image xmlns="71af3243-3dd4-4a8d-8c0d-dd76da1f02a5">
+      <Url xsi:nil="true"/>
+      <Description xsi:nil="true"/>
+    </Image>
+    <Status xmlns="71af3243-3dd4-4a8d-8c0d-dd76da1f02a5">Not started</Status>
+    <_ip_UnifiedCompliancePolicyProperties xmlns="http://schemas.microsoft.com/sharepoint/v3" xsi:nil="true"/>
+    <ImageTagsTaxHTField xmlns="71af3243-3dd4-4a8d-8c0d-dd76da1f02a5">
+      <Terms xmlns="http://schemas.microsoft.com/office/infopath/2007/PartnerControls"/>
+    </ImageTagsTaxHTField>
+    <TaxCatchAll xmlns="230e9df3-be65-4c73-a93b-d1236ebd677e" xsi:nil="true"/>
+    <MediaServiceKeyPoints xmlns="71af3243-3dd4-4a8d-8c0d-dd76da1f02a5" xsi:nil="true"/>
+    <Background xmlns="71af3243-3dd4-4a8d-8c0d-dd76da1f02a5">false</Background>
+  </documentManagement>
+</p:properties>
+</file>
+
+<file path=customXml/item2.xml><?xml version="1.0" encoding="utf-8"?>
+<?mso-contentType ?>
+<FormTemplates xmlns="http://schemas.microsoft.com/sharepoint/v3/contenttype/forms">
+  <Display>DocumentLibraryForm</Display>
+  <Edit>DocumentLibraryForm</Edit>
+  <New>DocumentLibraryForm</New>
+</FormTemplates>
+</file>
+
+<file path=customXml/item3.xml><?xml version="1.0" encoding="utf-8"?>
 <ct:contentTypeSchema xmlns:ct="http://schemas.microsoft.com/office/2006/metadata/contentType" xmlns:ma="http://schemas.microsoft.com/office/2006/metadata/properties/metaAttributes" ct:_="" ma:_="" ma:contentTypeName="Document" ma:contentTypeID="0x01010079F111ED35F8CC479449609E8A0923A6" ma:contentTypeVersion="28" ma:contentTypeDescription="Create a new document." ma:contentTypeScope="" ma:versionID="60f5a4f2d2b0abadcf532d48ebf9cb71">
   <xsd:schema xmlns:xsd="http://www.w3.org/2001/XMLSchema" xmlns:xs="http://www.w3.org/2001/XMLSchema" xmlns:p="http://schemas.microsoft.com/office/2006/metadata/properties" xmlns:ns1="http://schemas.microsoft.com/sharepoint/v3" xmlns:ns2="71af3243-3dd4-4a8d-8c0d-dd76da1f02a5" xmlns:ns3="16c05727-aa75-4e4a-9b5f-8a80a1165891" xmlns:ns4="230e9df3-be65-4c73-a93b-d1236ebd677e" targetNamespace="http://schemas.microsoft.com/office/2006/metadata/properties" ma:root="true" ma:fieldsID="7dd78129e6a1811f84807ad11c651531" ns1:_="" ns2:_="" ns3:_="" ns4:_="">
     <xsd:import namespace="http://schemas.microsoft.com/sharepoint/v3"/>
@@ -53421,36 +53459,27 @@
 </ct:contentTypeSchema>
 </file>
 
-<file path=customXml/item2.xml><?xml version="1.0" encoding="utf-8"?>
-<?mso-contentType ?>
-<FormTemplates xmlns="http://schemas.microsoft.com/sharepoint/v3/contenttype/forms">
-  <Display>DocumentLibraryForm</Display>
-  <Edit>DocumentLibraryForm</Edit>
-  <New>DocumentLibraryForm</New>
-</FormTemplates>
+<file path=customXml/itemProps1.xml><?xml version="1.0" encoding="utf-8"?>
+<ds:datastoreItem xmlns:ds="http://schemas.openxmlformats.org/officeDocument/2006/customXml" ds:itemID="{1B19A930-1B99-4E6A-8FC0-F4EC96DB90CA}">
+  <ds:schemaRefs>
+    <ds:schemaRef ds:uri="http://schemas.microsoft.com/office/2006/metadata/properties"/>
+    <ds:schemaRef ds:uri="http://schemas.microsoft.com/office/infopath/2007/PartnerControls"/>
+    <ds:schemaRef ds:uri="http://schemas.microsoft.com/sharepoint/v3"/>
+    <ds:schemaRef ds:uri="71af3243-3dd4-4a8d-8c0d-dd76da1f02a5"/>
+    <ds:schemaRef ds:uri="230e9df3-be65-4c73-a93b-d1236ebd677e"/>
+  </ds:schemaRefs>
+</ds:datastoreItem>
 </file>
 
-<file path=customXml/item3.xml><?xml version="1.0" encoding="utf-8"?>
-<p:properties xmlns:p="http://schemas.microsoft.com/office/2006/metadata/properties" xmlns:xsi="http://www.w3.org/2001/XMLSchema-instance" xmlns:pc="http://schemas.microsoft.com/office/infopath/2007/PartnerControls">
-  <documentManagement>
-    <_ip_UnifiedCompliancePolicyUIAction xmlns="http://schemas.microsoft.com/sharepoint/v3" xsi:nil="true"/>
-    <Image xmlns="71af3243-3dd4-4a8d-8c0d-dd76da1f02a5">
-      <Url xsi:nil="true"/>
-      <Description xsi:nil="true"/>
-    </Image>
-    <Status xmlns="71af3243-3dd4-4a8d-8c0d-dd76da1f02a5">Not started</Status>
-    <_ip_UnifiedCompliancePolicyProperties xmlns="http://schemas.microsoft.com/sharepoint/v3" xsi:nil="true"/>
-    <ImageTagsTaxHTField xmlns="71af3243-3dd4-4a8d-8c0d-dd76da1f02a5">
-      <Terms xmlns="http://schemas.microsoft.com/office/infopath/2007/PartnerControls"/>
-    </ImageTagsTaxHTField>
-    <TaxCatchAll xmlns="230e9df3-be65-4c73-a93b-d1236ebd677e" xsi:nil="true"/>
-    <MediaServiceKeyPoints xmlns="71af3243-3dd4-4a8d-8c0d-dd76da1f02a5" xsi:nil="true"/>
-    <Background xmlns="71af3243-3dd4-4a8d-8c0d-dd76da1f02a5">false</Background>
-  </documentManagement>
-</p:properties>
+<file path=customXml/itemProps2.xml><?xml version="1.0" encoding="utf-8"?>
+<ds:datastoreItem xmlns:ds="http://schemas.openxmlformats.org/officeDocument/2006/customXml" ds:itemID="{8B8D7BA3-8A6F-4F51-B1EE-3B01AA004FC5}">
+  <ds:schemaRefs>
+    <ds:schemaRef ds:uri="http://schemas.microsoft.com/sharepoint/v3/contenttype/forms"/>
+  </ds:schemaRefs>
+</ds:datastoreItem>
 </file>
 
-<file path=customXml/itemProps1.xml><?xml version="1.0" encoding="utf-8"?>
+<file path=customXml/itemProps3.xml><?xml version="1.0" encoding="utf-8"?>
 <ds:datastoreItem xmlns:ds="http://schemas.openxmlformats.org/officeDocument/2006/customXml" ds:itemID="{C80DA2CF-4896-4B03-AE27-7F4BBB1B630E}">
   <ds:schemaRefs>
     <ds:schemaRef ds:uri="http://schemas.microsoft.com/office/2006/metadata/contentType"/>
@@ -53471,26 +53500,6 @@
 </ds:datastoreItem>
 </file>
 
-<file path=customXml/itemProps2.xml><?xml version="1.0" encoding="utf-8"?>
-<ds:datastoreItem xmlns:ds="http://schemas.openxmlformats.org/officeDocument/2006/customXml" ds:itemID="{8B8D7BA3-8A6F-4F51-B1EE-3B01AA004FC5}">
-  <ds:schemaRefs>
-    <ds:schemaRef ds:uri="http://schemas.microsoft.com/sharepoint/v3/contenttype/forms"/>
-  </ds:schemaRefs>
-</ds:datastoreItem>
-</file>
-
-<file path=customXml/itemProps3.xml><?xml version="1.0" encoding="utf-8"?>
-<ds:datastoreItem xmlns:ds="http://schemas.openxmlformats.org/officeDocument/2006/customXml" ds:itemID="{1B19A930-1B99-4E6A-8FC0-F4EC96DB90CA}">
-  <ds:schemaRefs>
-    <ds:schemaRef ds:uri="http://schemas.microsoft.com/office/2006/metadata/properties"/>
-    <ds:schemaRef ds:uri="http://schemas.microsoft.com/office/infopath/2007/PartnerControls"/>
-    <ds:schemaRef ds:uri="http://schemas.microsoft.com/sharepoint/v3"/>
-    <ds:schemaRef ds:uri="71af3243-3dd4-4a8d-8c0d-dd76da1f02a5"/>
-    <ds:schemaRef ds:uri="230e9df3-be65-4c73-a93b-d1236ebd677e"/>
-  </ds:schemaRefs>
-</ds:datastoreItem>
-</file>
-
 <file path=docMetadata/LabelInfo.xml><?xml version="1.0" encoding="utf-8"?>
 <clbl:labelList xmlns:clbl="http://schemas.microsoft.com/office/2020/mipLabelMetadata"/>
 </file>
</xml_diff>